<commit_message>
Update Lisbon 1 StandardsIntroduction.pptx
</commit_message>
<xml_diff>
--- a/Events/LSSL2022/CourseMaterial/Lisbon 1 StandardsIntroduction.pptx
+++ b/Events/LSSL2022/CourseMaterial/Lisbon 1 StandardsIntroduction.pptx
@@ -274,7 +274,7 @@
           <a:p>
             <a:fld id="{60D9C778-B7C0-CD46-A0D8-B657C409AB14}" type="datetimeFigureOut">
               <a:rPr lang="fr-FR" smtClean="0"/>
-              <a:t>28/06/2022</a:t>
+              <a:t>04/07/2022</a:t>
             </a:fld>
             <a:endParaRPr lang="fr-FR"/>
           </a:p>
@@ -439,7 +439,7 @@
           <a:p>
             <a:fld id="{0241B261-1266-6B4C-99F5-087F4891DA7F}" type="datetimeFigureOut">
               <a:rPr lang="fr-FR" smtClean="0"/>
-              <a:t>28/06/2022</a:t>
+              <a:t>04/07/2022</a:t>
             </a:fld>
             <a:endParaRPr lang="fr-FR"/>
           </a:p>
@@ -2050,7 +2050,7 @@
           <a:p>
             <a:fld id="{5FBC8024-F767-0648-8C2E-5E8679A0AE78}" type="datetimeFigureOut">
               <a:rPr lang="fr-FR" smtClean="0"/>
-              <a:t>28/06/2022</a:t>
+              <a:t>04/07/2022</a:t>
             </a:fld>
             <a:endParaRPr lang="fr-FR"/>
           </a:p>
@@ -2218,7 +2218,7 @@
           <a:p>
             <a:fld id="{5FBC8024-F767-0648-8C2E-5E8679A0AE78}" type="datetimeFigureOut">
               <a:rPr lang="fr-FR" smtClean="0"/>
-              <a:t>28/06/2022</a:t>
+              <a:t>04/07/2022</a:t>
             </a:fld>
             <a:endParaRPr lang="fr-FR"/>
           </a:p>
@@ -2396,7 +2396,7 @@
           <a:p>
             <a:fld id="{5FBC8024-F767-0648-8C2E-5E8679A0AE78}" type="datetimeFigureOut">
               <a:rPr lang="fr-FR" smtClean="0"/>
-              <a:t>28/06/2022</a:t>
+              <a:t>04/07/2022</a:t>
             </a:fld>
             <a:endParaRPr lang="fr-FR"/>
           </a:p>
@@ -2564,7 +2564,7 @@
           <a:p>
             <a:fld id="{5FBC8024-F767-0648-8C2E-5E8679A0AE78}" type="datetimeFigureOut">
               <a:rPr lang="fr-FR" smtClean="0"/>
-              <a:t>28/06/2022</a:t>
+              <a:t>04/07/2022</a:t>
             </a:fld>
             <a:endParaRPr lang="fr-FR"/>
           </a:p>
@@ -2809,7 +2809,7 @@
           <a:p>
             <a:fld id="{5FBC8024-F767-0648-8C2E-5E8679A0AE78}" type="datetimeFigureOut">
               <a:rPr lang="fr-FR" smtClean="0"/>
-              <a:t>28/06/2022</a:t>
+              <a:t>04/07/2022</a:t>
             </a:fld>
             <a:endParaRPr lang="fr-FR"/>
           </a:p>
@@ -3094,7 +3094,7 @@
           <a:p>
             <a:fld id="{5FBC8024-F767-0648-8C2E-5E8679A0AE78}" type="datetimeFigureOut">
               <a:rPr lang="fr-FR" smtClean="0"/>
-              <a:t>28/06/2022</a:t>
+              <a:t>04/07/2022</a:t>
             </a:fld>
             <a:endParaRPr lang="fr-FR"/>
           </a:p>
@@ -3513,7 +3513,7 @@
           <a:p>
             <a:fld id="{5FBC8024-F767-0648-8C2E-5E8679A0AE78}" type="datetimeFigureOut">
               <a:rPr lang="fr-FR" smtClean="0"/>
-              <a:t>28/06/2022</a:t>
+              <a:t>04/07/2022</a:t>
             </a:fld>
             <a:endParaRPr lang="fr-FR"/>
           </a:p>
@@ -3630,7 +3630,7 @@
           <a:p>
             <a:fld id="{5FBC8024-F767-0648-8C2E-5E8679A0AE78}" type="datetimeFigureOut">
               <a:rPr lang="fr-FR" smtClean="0"/>
-              <a:t>28/06/2022</a:t>
+              <a:t>04/07/2022</a:t>
             </a:fld>
             <a:endParaRPr lang="fr-FR"/>
           </a:p>
@@ -3725,7 +3725,7 @@
           <a:p>
             <a:fld id="{5FBC8024-F767-0648-8C2E-5E8679A0AE78}" type="datetimeFigureOut">
               <a:rPr lang="fr-FR" smtClean="0"/>
-              <a:t>28/06/2022</a:t>
+              <a:t>04/07/2022</a:t>
             </a:fld>
             <a:endParaRPr lang="fr-FR"/>
           </a:p>
@@ -4000,7 +4000,7 @@
           <a:p>
             <a:fld id="{5FBC8024-F767-0648-8C2E-5E8679A0AE78}" type="datetimeFigureOut">
               <a:rPr lang="fr-FR" smtClean="0"/>
-              <a:t>28/06/2022</a:t>
+              <a:t>04/07/2022</a:t>
             </a:fld>
             <a:endParaRPr lang="fr-FR"/>
           </a:p>
@@ -4252,7 +4252,7 @@
           <a:p>
             <a:fld id="{5FBC8024-F767-0648-8C2E-5E8679A0AE78}" type="datetimeFigureOut">
               <a:rPr lang="fr-FR" smtClean="0"/>
-              <a:t>28/06/2022</a:t>
+              <a:t>04/07/2022</a:t>
             </a:fld>
             <a:endParaRPr lang="fr-FR"/>
           </a:p>
@@ -4463,7 +4463,7 @@
           <a:p>
             <a:fld id="{5FBC8024-F767-0648-8C2E-5E8679A0AE78}" type="datetimeFigureOut">
               <a:rPr lang="fr-FR" smtClean="0"/>
-              <a:t>28/06/2022</a:t>
+              <a:t>04/07/2022</a:t>
             </a:fld>
             <a:endParaRPr lang="fr-FR"/>
           </a:p>
@@ -6595,7 +6595,7 @@
         <p:spPr/>
         <p:txBody>
           <a:bodyPr>
-            <a:normAutofit fontScale="92500" lnSpcReduction="10000"/>
+            <a:normAutofit fontScale="85000" lnSpcReduction="10000"/>
           </a:bodyPr>
           <a:lstStyle/>
           <a:p>
@@ -6657,8 +6657,23 @@
             <a:pPr lvl="1"/>
             <a:r>
               <a:rPr lang="en-GB" dirty="0"/>
-              <a:t>Slides and exercises available on: ++GITHUB++</a:t>
-            </a:r>
+              <a:t>Slides and exercises available on: </a:t>
+            </a:r>
+            <a:r>
+              <a:rPr lang="en-GB" dirty="0">
+                <a:hlinkClick r:id="rId2"/>
+              </a:rPr>
+              <a:t>https://github.com/DARIAH-ERIC/lexicalresources</a:t>
+            </a:r>
+            <a:endParaRPr lang="en-GB" dirty="0"/>
+          </a:p>
+          <a:p>
+            <a:pPr lvl="1"/>
+            <a:r>
+              <a:rPr lang="en-GB"/>
+              <a:t>(Events/LSSL2022)</a:t>
+            </a:r>
+            <a:endParaRPr lang="en-GB" dirty="0"/>
           </a:p>
         </p:txBody>
       </p:sp>
@@ -8957,7 +8972,7 @@
                       <a:noFill/>
                       <a:extLst>
                         <a:ext uri="{909E8E84-426E-40dd-AFC4-6F175D3DCCD1}">
-                          <a14:hiddenFill xmlns:a14="http://schemas.microsoft.com/office/drawing/2010/main" xmlns="">
+                          <a14:hiddenFill xmlns="" xmlns:a14="http://schemas.microsoft.com/office/drawing/2010/main">
                             <a:solidFill>
                               <a:srgbClr val="FFFFFF"/>
                             </a:solidFill>

</xml_diff>